<commit_message>
docs: week-1: Make my own modification and notes
* Also regenerate the assets.

Signed-off-by: Bedirhan KURT <bedirhan.kurt.trjp@gmail.com>
</commit_message>
<xml_diff>
--- a/docs/week-1/week-1.tr.md_word.pptx
+++ b/docs/week-1/week-1.tr.md_word.pptx
@@ -23,7 +23,7 @@
     <p:sldId id="271" r:id="rId17"/>
     <p:sldId id="272" r:id="rId18"/>
   </p:sldIdLst>
-  <p:sldSz cx="9144000" cy="6858000" type="screen4x3"/>
+  <p:sldSz cx="9144000" cy="5143500" type="screen16x9"/>
   <p:notesSz cx="6858000" cy="9144000"/>
   <p:defaultTextStyle>
     <a:defPPr>
@@ -123,12 +123,12 @@
   <p:extLst>
     <p:ext uri="{EFAFB233-063F-42B5-8137-9DF3F51BA10A}">
       <p15:sldGuideLst xmlns:p15="http://schemas.microsoft.com/office/powerpoint/2012/main">
-        <p15:guide id="1" orient="horz" pos="2160">
+        <p15:guide id="1" orient="horz" pos="1620" userDrawn="1">
           <p15:clr>
             <a:srgbClr val="A4A3A4"/>
           </p15:clr>
         </p15:guide>
-        <p15:guide id="2" pos="2880">
+        <p15:guide id="2" pos="2880" userDrawn="1">
           <p15:clr>
             <a:srgbClr val="A4A3A4"/>
           </p15:clr>
@@ -168,8 +168,8 @@
         </p:nvSpPr>
         <p:spPr>
           <a:xfrm>
-            <a:off x="685800" y="2130425"/>
-            <a:ext cx="7772400" cy="1470025"/>
+            <a:off x="685800" y="1597819"/>
+            <a:ext cx="7772400" cy="1102519"/>
           </a:xfrm>
         </p:spPr>
         <p:txBody>
@@ -177,10 +177,9 @@
           <a:lstStyle/>
           <a:p>
             <a:r>
-              <a:rPr lang="en-US" smtClean="0"/>
+              <a:rPr lang="en-US"/>
               <a:t>Click to edit Master title style</a:t>
             </a:r>
-            <a:endParaRPr lang="en-US"/>
           </a:p>
         </p:txBody>
       </p:sp>
@@ -196,8 +195,8 @@
         </p:nvSpPr>
         <p:spPr>
           <a:xfrm>
-            <a:off x="1371600" y="3886200"/>
-            <a:ext cx="6400800" cy="1752600"/>
+            <a:off x="1371600" y="2914650"/>
+            <a:ext cx="6400800" cy="1314450"/>
           </a:xfrm>
         </p:spPr>
         <p:txBody>
@@ -213,7 +212,7 @@
                 </a:solidFill>
               </a:defRPr>
             </a:lvl1pPr>
-            <a:lvl2pPr marL="457200" indent="0" algn="ctr">
+            <a:lvl2pPr marL="342900" indent="0" algn="ctr">
               <a:buNone/>
               <a:defRPr>
                 <a:solidFill>
@@ -223,7 +222,7 @@
                 </a:solidFill>
               </a:defRPr>
             </a:lvl2pPr>
-            <a:lvl3pPr marL="914400" indent="0" algn="ctr">
+            <a:lvl3pPr marL="685800" indent="0" algn="ctr">
               <a:buNone/>
               <a:defRPr>
                 <a:solidFill>
@@ -233,7 +232,7 @@
                 </a:solidFill>
               </a:defRPr>
             </a:lvl3pPr>
-            <a:lvl4pPr marL="1371600" indent="0" algn="ctr">
+            <a:lvl4pPr marL="1028700" indent="0" algn="ctr">
               <a:buNone/>
               <a:defRPr>
                 <a:solidFill>
@@ -243,7 +242,7 @@
                 </a:solidFill>
               </a:defRPr>
             </a:lvl4pPr>
-            <a:lvl5pPr marL="1828800" indent="0" algn="ctr">
+            <a:lvl5pPr marL="1371600" indent="0" algn="ctr">
               <a:buNone/>
               <a:defRPr>
                 <a:solidFill>
@@ -253,7 +252,7 @@
                 </a:solidFill>
               </a:defRPr>
             </a:lvl5pPr>
-            <a:lvl6pPr marL="2286000" indent="0" algn="ctr">
+            <a:lvl6pPr marL="1714500" indent="0" algn="ctr">
               <a:buNone/>
               <a:defRPr>
                 <a:solidFill>
@@ -263,7 +262,7 @@
                 </a:solidFill>
               </a:defRPr>
             </a:lvl6pPr>
-            <a:lvl7pPr marL="2743200" indent="0" algn="ctr">
+            <a:lvl7pPr marL="2057400" indent="0" algn="ctr">
               <a:buNone/>
               <a:defRPr>
                 <a:solidFill>
@@ -273,7 +272,7 @@
                 </a:solidFill>
               </a:defRPr>
             </a:lvl7pPr>
-            <a:lvl8pPr marL="3200400" indent="0" algn="ctr">
+            <a:lvl8pPr marL="2400300" indent="0" algn="ctr">
               <a:buNone/>
               <a:defRPr>
                 <a:solidFill>
@@ -283,7 +282,7 @@
                 </a:solidFill>
               </a:defRPr>
             </a:lvl8pPr>
-            <a:lvl9pPr marL="3657600" indent="0" algn="ctr">
+            <a:lvl9pPr marL="2743200" indent="0" algn="ctr">
               <a:buNone/>
               <a:defRPr>
                 <a:solidFill>
@@ -296,10 +295,9 @@
           </a:lstStyle>
           <a:p>
             <a:r>
-              <a:rPr lang="en-US" smtClean="0"/>
+              <a:rPr lang="en-US"/>
               <a:t>Click to edit Master subtitle style</a:t>
             </a:r>
-            <a:endParaRPr lang="en-US"/>
           </a:p>
         </p:txBody>
       </p:sp>
@@ -320,7 +318,7 @@
           <a:p>
             <a:fld id="{241EB5C9-1307-BA42-ABA2-0BC069CD8E7F}" type="datetimeFigureOut">
               <a:rPr lang="en-US" smtClean="0"/>
-              <a:t>4/5/2019</a:t>
+              <a:t>1/2/22</a:t>
             </a:fld>
             <a:endParaRPr lang="en-US"/>
           </a:p>
@@ -414,10 +412,9 @@
           <a:lstStyle/>
           <a:p>
             <a:r>
-              <a:rPr lang="en-US" smtClean="0"/>
+              <a:rPr lang="en-US"/>
               <a:t>Click to edit Master title style</a:t>
             </a:r>
-            <a:endParaRPr lang="en-US"/>
           </a:p>
         </p:txBody>
       </p:sp>
@@ -438,38 +435,37 @@
           <a:p>
             <a:pPr lvl="0"/>
             <a:r>
-              <a:rPr lang="en-US" smtClean="0"/>
+              <a:rPr lang="en-US"/>
               <a:t>Click to edit Master text styles</a:t>
             </a:r>
           </a:p>
           <a:p>
             <a:pPr lvl="1"/>
             <a:r>
-              <a:rPr lang="en-US" smtClean="0"/>
+              <a:rPr lang="en-US"/>
               <a:t>Second level</a:t>
             </a:r>
           </a:p>
           <a:p>
             <a:pPr lvl="2"/>
             <a:r>
-              <a:rPr lang="en-US" smtClean="0"/>
+              <a:rPr lang="en-US"/>
               <a:t>Third level</a:t>
             </a:r>
           </a:p>
           <a:p>
             <a:pPr lvl="3"/>
             <a:r>
-              <a:rPr lang="en-US" smtClean="0"/>
+              <a:rPr lang="en-US"/>
               <a:t>Fourth level</a:t>
             </a:r>
           </a:p>
           <a:p>
             <a:pPr lvl="4"/>
             <a:r>
-              <a:rPr lang="en-US" smtClean="0"/>
+              <a:rPr lang="en-US"/>
               <a:t>Fifth level</a:t>
             </a:r>
-            <a:endParaRPr lang="en-US"/>
           </a:p>
         </p:txBody>
       </p:sp>
@@ -490,7 +486,7 @@
           <a:p>
             <a:fld id="{241EB5C9-1307-BA42-ABA2-0BC069CD8E7F}" type="datetimeFigureOut">
               <a:rPr lang="en-US" smtClean="0"/>
-              <a:t>4/5/2019</a:t>
+              <a:t>1/2/22</a:t>
             </a:fld>
             <a:endParaRPr lang="en-US"/>
           </a:p>
@@ -580,8 +576,8 @@
         </p:nvSpPr>
         <p:spPr>
           <a:xfrm>
-            <a:off x="6629400" y="274638"/>
-            <a:ext cx="2057400" cy="5851525"/>
+            <a:off x="6629400" y="205979"/>
+            <a:ext cx="2057400" cy="4388644"/>
           </a:xfrm>
         </p:spPr>
         <p:txBody>
@@ -589,10 +585,9 @@
           <a:lstStyle/>
           <a:p>
             <a:r>
-              <a:rPr lang="en-US" smtClean="0"/>
+              <a:rPr lang="en-US"/>
               <a:t>Click to edit Master title style</a:t>
             </a:r>
-            <a:endParaRPr lang="en-US"/>
           </a:p>
         </p:txBody>
       </p:sp>
@@ -608,8 +603,8 @@
         </p:nvSpPr>
         <p:spPr>
           <a:xfrm>
-            <a:off x="457200" y="274638"/>
-            <a:ext cx="6019800" cy="5851525"/>
+            <a:off x="457200" y="205979"/>
+            <a:ext cx="6019800" cy="4388644"/>
           </a:xfrm>
         </p:spPr>
         <p:txBody>
@@ -618,38 +613,37 @@
           <a:p>
             <a:pPr lvl="0"/>
             <a:r>
-              <a:rPr lang="en-US" smtClean="0"/>
+              <a:rPr lang="en-US"/>
               <a:t>Click to edit Master text styles</a:t>
             </a:r>
           </a:p>
           <a:p>
             <a:pPr lvl="1"/>
             <a:r>
-              <a:rPr lang="en-US" smtClean="0"/>
+              <a:rPr lang="en-US"/>
               <a:t>Second level</a:t>
             </a:r>
           </a:p>
           <a:p>
             <a:pPr lvl="2"/>
             <a:r>
-              <a:rPr lang="en-US" smtClean="0"/>
+              <a:rPr lang="en-US"/>
               <a:t>Third level</a:t>
             </a:r>
           </a:p>
           <a:p>
             <a:pPr lvl="3"/>
             <a:r>
-              <a:rPr lang="en-US" smtClean="0"/>
+              <a:rPr lang="en-US"/>
               <a:t>Fourth level</a:t>
             </a:r>
           </a:p>
           <a:p>
             <a:pPr lvl="4"/>
             <a:r>
-              <a:rPr lang="en-US" smtClean="0"/>
+              <a:rPr lang="en-US"/>
               <a:t>Fifth level</a:t>
             </a:r>
-            <a:endParaRPr lang="en-US"/>
           </a:p>
         </p:txBody>
       </p:sp>
@@ -670,7 +664,7 @@
           <a:p>
             <a:fld id="{241EB5C9-1307-BA42-ABA2-0BC069CD8E7F}" type="datetimeFigureOut">
               <a:rPr lang="en-US" smtClean="0"/>
-              <a:t>4/5/2019</a:t>
+              <a:t>1/2/22</a:t>
             </a:fld>
             <a:endParaRPr lang="en-US"/>
           </a:p>
@@ -764,10 +758,9 @@
           <a:lstStyle/>
           <a:p>
             <a:r>
-              <a:rPr lang="en-US" smtClean="0"/>
+              <a:rPr lang="en-US"/>
               <a:t>Click to edit Master title style</a:t>
             </a:r>
-            <a:endParaRPr lang="en-US"/>
           </a:p>
         </p:txBody>
       </p:sp>
@@ -788,38 +781,37 @@
           <a:p>
             <a:pPr lvl="0"/>
             <a:r>
-              <a:rPr lang="en-US" smtClean="0"/>
+              <a:rPr lang="en-US"/>
               <a:t>Click to edit Master text styles</a:t>
             </a:r>
           </a:p>
           <a:p>
             <a:pPr lvl="1"/>
             <a:r>
-              <a:rPr lang="en-US" smtClean="0"/>
+              <a:rPr lang="en-US"/>
               <a:t>Second level</a:t>
             </a:r>
           </a:p>
           <a:p>
             <a:pPr lvl="2"/>
             <a:r>
-              <a:rPr lang="en-US" smtClean="0"/>
+              <a:rPr lang="en-US"/>
               <a:t>Third level</a:t>
             </a:r>
           </a:p>
           <a:p>
             <a:pPr lvl="3"/>
             <a:r>
-              <a:rPr lang="en-US" smtClean="0"/>
+              <a:rPr lang="en-US"/>
               <a:t>Fourth level</a:t>
             </a:r>
           </a:p>
           <a:p>
             <a:pPr lvl="4"/>
             <a:r>
-              <a:rPr lang="en-US" smtClean="0"/>
+              <a:rPr lang="en-US"/>
               <a:t>Fifth level</a:t>
             </a:r>
-            <a:endParaRPr lang="en-US"/>
           </a:p>
         </p:txBody>
       </p:sp>
@@ -840,7 +832,7 @@
           <a:p>
             <a:fld id="{241EB5C9-1307-BA42-ABA2-0BC069CD8E7F}" type="datetimeFigureOut">
               <a:rPr lang="en-US" smtClean="0"/>
-              <a:t>4/5/2019</a:t>
+              <a:t>1/2/22</a:t>
             </a:fld>
             <a:endParaRPr lang="en-US"/>
           </a:p>
@@ -930,23 +922,22 @@
         </p:nvSpPr>
         <p:spPr>
           <a:xfrm>
-            <a:off x="722313" y="4406900"/>
-            <a:ext cx="7772400" cy="1362075"/>
+            <a:off x="722313" y="3305176"/>
+            <a:ext cx="7772400" cy="1021556"/>
           </a:xfrm>
         </p:spPr>
         <p:txBody>
           <a:bodyPr anchor="t"/>
           <a:lstStyle>
             <a:lvl1pPr algn="l">
-              <a:defRPr sz="4000" b="1" cap="all"/>
+              <a:defRPr sz="3000" b="1" cap="all"/>
             </a:lvl1pPr>
           </a:lstStyle>
           <a:p>
             <a:r>
-              <a:rPr lang="en-US" smtClean="0"/>
+              <a:rPr lang="en-US"/>
               <a:t>Click to edit Master title style</a:t>
             </a:r>
-            <a:endParaRPr lang="en-US"/>
           </a:p>
         </p:txBody>
       </p:sp>
@@ -962,8 +953,8 @@
         </p:nvSpPr>
         <p:spPr>
           <a:xfrm>
-            <a:off x="722313" y="2906713"/>
-            <a:ext cx="7772400" cy="1500187"/>
+            <a:off x="722313" y="2180035"/>
+            <a:ext cx="7772400" cy="1125140"/>
           </a:xfrm>
         </p:spPr>
         <p:txBody>
@@ -971,7 +962,7 @@
           <a:lstStyle>
             <a:lvl1pPr marL="0" indent="0">
               <a:buNone/>
-              <a:defRPr sz="2000">
+              <a:defRPr sz="1500">
                 <a:solidFill>
                   <a:schemeClr val="tx1">
                     <a:tint val="75000"/>
@@ -979,9 +970,9 @@
                 </a:solidFill>
               </a:defRPr>
             </a:lvl1pPr>
-            <a:lvl2pPr marL="457200" indent="0">
-              <a:buNone/>
-              <a:defRPr sz="1800">
+            <a:lvl2pPr marL="342900" indent="0">
+              <a:buNone/>
+              <a:defRPr sz="1350">
                 <a:solidFill>
                   <a:schemeClr val="tx1">
                     <a:tint val="75000"/>
@@ -989,9 +980,9 @@
                 </a:solidFill>
               </a:defRPr>
             </a:lvl2pPr>
-            <a:lvl3pPr marL="914400" indent="0">
-              <a:buNone/>
-              <a:defRPr sz="1600">
+            <a:lvl3pPr marL="685800" indent="0">
+              <a:buNone/>
+              <a:defRPr sz="1200">
                 <a:solidFill>
                   <a:schemeClr val="tx1">
                     <a:tint val="75000"/>
@@ -999,9 +990,9 @@
                 </a:solidFill>
               </a:defRPr>
             </a:lvl3pPr>
-            <a:lvl4pPr marL="1371600" indent="0">
-              <a:buNone/>
-              <a:defRPr sz="1400">
+            <a:lvl4pPr marL="1028700" indent="0">
+              <a:buNone/>
+              <a:defRPr sz="1050">
                 <a:solidFill>
                   <a:schemeClr val="tx1">
                     <a:tint val="75000"/>
@@ -1009,9 +1000,9 @@
                 </a:solidFill>
               </a:defRPr>
             </a:lvl4pPr>
-            <a:lvl5pPr marL="1828800" indent="0">
-              <a:buNone/>
-              <a:defRPr sz="1400">
+            <a:lvl5pPr marL="1371600" indent="0">
+              <a:buNone/>
+              <a:defRPr sz="1050">
                 <a:solidFill>
                   <a:schemeClr val="tx1">
                     <a:tint val="75000"/>
@@ -1019,9 +1010,9 @@
                 </a:solidFill>
               </a:defRPr>
             </a:lvl5pPr>
-            <a:lvl6pPr marL="2286000" indent="0">
-              <a:buNone/>
-              <a:defRPr sz="1400">
+            <a:lvl6pPr marL="1714500" indent="0">
+              <a:buNone/>
+              <a:defRPr sz="1050">
                 <a:solidFill>
                   <a:schemeClr val="tx1">
                     <a:tint val="75000"/>
@@ -1029,9 +1020,9 @@
                 </a:solidFill>
               </a:defRPr>
             </a:lvl6pPr>
-            <a:lvl7pPr marL="2743200" indent="0">
-              <a:buNone/>
-              <a:defRPr sz="1400">
+            <a:lvl7pPr marL="2057400" indent="0">
+              <a:buNone/>
+              <a:defRPr sz="1050">
                 <a:solidFill>
                   <a:schemeClr val="tx1">
                     <a:tint val="75000"/>
@@ -1039,9 +1030,9 @@
                 </a:solidFill>
               </a:defRPr>
             </a:lvl7pPr>
-            <a:lvl8pPr marL="3200400" indent="0">
-              <a:buNone/>
-              <a:defRPr sz="1400">
+            <a:lvl8pPr marL="2400300" indent="0">
+              <a:buNone/>
+              <a:defRPr sz="1050">
                 <a:solidFill>
                   <a:schemeClr val="tx1">
                     <a:tint val="75000"/>
@@ -1049,9 +1040,9 @@
                 </a:solidFill>
               </a:defRPr>
             </a:lvl8pPr>
-            <a:lvl9pPr marL="3657600" indent="0">
-              <a:buNone/>
-              <a:defRPr sz="1400">
+            <a:lvl9pPr marL="2743200" indent="0">
+              <a:buNone/>
+              <a:defRPr sz="1050">
                 <a:solidFill>
                   <a:schemeClr val="tx1">
                     <a:tint val="75000"/>
@@ -1063,7 +1054,7 @@
           <a:p>
             <a:pPr lvl="0"/>
             <a:r>
-              <a:rPr lang="en-US" smtClean="0"/>
+              <a:rPr lang="en-US"/>
               <a:t>Click to edit Master text styles</a:t>
             </a:r>
           </a:p>
@@ -1086,7 +1077,7 @@
           <a:p>
             <a:fld id="{241EB5C9-1307-BA42-ABA2-0BC069CD8E7F}" type="datetimeFigureOut">
               <a:rPr lang="en-US" smtClean="0"/>
-              <a:t>4/5/2019</a:t>
+              <a:t>1/2/22</a:t>
             </a:fld>
             <a:endParaRPr lang="en-US"/>
           </a:p>
@@ -1180,10 +1171,9 @@
           <a:lstStyle/>
           <a:p>
             <a:r>
-              <a:rPr lang="en-US" smtClean="0"/>
+              <a:rPr lang="en-US"/>
               <a:t>Click to edit Master title style</a:t>
             </a:r>
-            <a:endParaRPr lang="en-US"/>
           </a:p>
         </p:txBody>
       </p:sp>
@@ -1199,76 +1189,75 @@
         </p:nvSpPr>
         <p:spPr>
           <a:xfrm>
-            <a:off x="457200" y="1600200"/>
-            <a:ext cx="4038600" cy="4525963"/>
+            <a:off x="457200" y="1200151"/>
+            <a:ext cx="4038600" cy="3394472"/>
           </a:xfrm>
         </p:spPr>
         <p:txBody>
           <a:bodyPr/>
           <a:lstStyle>
             <a:lvl1pPr>
-              <a:defRPr sz="2800"/>
+              <a:defRPr sz="2100"/>
             </a:lvl1pPr>
             <a:lvl2pPr>
-              <a:defRPr sz="2400"/>
+              <a:defRPr sz="1800"/>
             </a:lvl2pPr>
             <a:lvl3pPr>
-              <a:defRPr sz="2000"/>
+              <a:defRPr sz="1500"/>
             </a:lvl3pPr>
             <a:lvl4pPr>
-              <a:defRPr sz="1800"/>
+              <a:defRPr sz="1350"/>
             </a:lvl4pPr>
             <a:lvl5pPr>
-              <a:defRPr sz="1800"/>
+              <a:defRPr sz="1350"/>
             </a:lvl5pPr>
             <a:lvl6pPr>
-              <a:defRPr sz="1800"/>
+              <a:defRPr sz="1350"/>
             </a:lvl6pPr>
             <a:lvl7pPr>
-              <a:defRPr sz="1800"/>
+              <a:defRPr sz="1350"/>
             </a:lvl7pPr>
             <a:lvl8pPr>
-              <a:defRPr sz="1800"/>
+              <a:defRPr sz="1350"/>
             </a:lvl8pPr>
             <a:lvl9pPr>
-              <a:defRPr sz="1800"/>
+              <a:defRPr sz="1350"/>
             </a:lvl9pPr>
           </a:lstStyle>
           <a:p>
             <a:pPr lvl="0"/>
             <a:r>
-              <a:rPr lang="en-US" smtClean="0"/>
+              <a:rPr lang="en-US"/>
               <a:t>Click to edit Master text styles</a:t>
             </a:r>
           </a:p>
           <a:p>
             <a:pPr lvl="1"/>
             <a:r>
-              <a:rPr lang="en-US" smtClean="0"/>
+              <a:rPr lang="en-US"/>
               <a:t>Second level</a:t>
             </a:r>
           </a:p>
           <a:p>
             <a:pPr lvl="2"/>
             <a:r>
-              <a:rPr lang="en-US" smtClean="0"/>
+              <a:rPr lang="en-US"/>
               <a:t>Third level</a:t>
             </a:r>
           </a:p>
           <a:p>
             <a:pPr lvl="3"/>
             <a:r>
-              <a:rPr lang="en-US" smtClean="0"/>
+              <a:rPr lang="en-US"/>
               <a:t>Fourth level</a:t>
             </a:r>
           </a:p>
           <a:p>
             <a:pPr lvl="4"/>
             <a:r>
-              <a:rPr lang="en-US" smtClean="0"/>
+              <a:rPr lang="en-US"/>
               <a:t>Fifth level</a:t>
             </a:r>
-            <a:endParaRPr lang="en-US"/>
           </a:p>
         </p:txBody>
       </p:sp>
@@ -1284,76 +1273,75 @@
         </p:nvSpPr>
         <p:spPr>
           <a:xfrm>
-            <a:off x="4648200" y="1600200"/>
-            <a:ext cx="4038600" cy="4525963"/>
+            <a:off x="4648200" y="1200151"/>
+            <a:ext cx="4038600" cy="3394472"/>
           </a:xfrm>
         </p:spPr>
         <p:txBody>
           <a:bodyPr/>
           <a:lstStyle>
             <a:lvl1pPr>
-              <a:defRPr sz="2800"/>
+              <a:defRPr sz="2100"/>
             </a:lvl1pPr>
             <a:lvl2pPr>
-              <a:defRPr sz="2400"/>
+              <a:defRPr sz="1800"/>
             </a:lvl2pPr>
             <a:lvl3pPr>
-              <a:defRPr sz="2000"/>
+              <a:defRPr sz="1500"/>
             </a:lvl3pPr>
             <a:lvl4pPr>
-              <a:defRPr sz="1800"/>
+              <a:defRPr sz="1350"/>
             </a:lvl4pPr>
             <a:lvl5pPr>
-              <a:defRPr sz="1800"/>
+              <a:defRPr sz="1350"/>
             </a:lvl5pPr>
             <a:lvl6pPr>
-              <a:defRPr sz="1800"/>
+              <a:defRPr sz="1350"/>
             </a:lvl6pPr>
             <a:lvl7pPr>
-              <a:defRPr sz="1800"/>
+              <a:defRPr sz="1350"/>
             </a:lvl7pPr>
             <a:lvl8pPr>
-              <a:defRPr sz="1800"/>
+              <a:defRPr sz="1350"/>
             </a:lvl8pPr>
             <a:lvl9pPr>
-              <a:defRPr sz="1800"/>
+              <a:defRPr sz="1350"/>
             </a:lvl9pPr>
           </a:lstStyle>
           <a:p>
             <a:pPr lvl="0"/>
             <a:r>
-              <a:rPr lang="en-US" smtClean="0"/>
+              <a:rPr lang="en-US"/>
               <a:t>Click to edit Master text styles</a:t>
             </a:r>
           </a:p>
           <a:p>
             <a:pPr lvl="1"/>
             <a:r>
-              <a:rPr lang="en-US" smtClean="0"/>
+              <a:rPr lang="en-US"/>
               <a:t>Second level</a:t>
             </a:r>
           </a:p>
           <a:p>
             <a:pPr lvl="2"/>
             <a:r>
-              <a:rPr lang="en-US" smtClean="0"/>
+              <a:rPr lang="en-US"/>
               <a:t>Third level</a:t>
             </a:r>
           </a:p>
           <a:p>
             <a:pPr lvl="3"/>
             <a:r>
-              <a:rPr lang="en-US" smtClean="0"/>
+              <a:rPr lang="en-US"/>
               <a:t>Fourth level</a:t>
             </a:r>
           </a:p>
           <a:p>
             <a:pPr lvl="4"/>
             <a:r>
-              <a:rPr lang="en-US" smtClean="0"/>
+              <a:rPr lang="en-US"/>
               <a:t>Fifth level</a:t>
             </a:r>
-            <a:endParaRPr lang="en-US"/>
           </a:p>
         </p:txBody>
       </p:sp>
@@ -1374,7 +1362,7 @@
           <a:p>
             <a:fld id="{241EB5C9-1307-BA42-ABA2-0BC069CD8E7F}" type="datetimeFigureOut">
               <a:rPr lang="en-US" smtClean="0"/>
-              <a:t>4/5/2019</a:t>
+              <a:t>1/2/22</a:t>
             </a:fld>
             <a:endParaRPr lang="en-US"/>
           </a:p>
@@ -1472,10 +1460,9 @@
           </a:lstStyle>
           <a:p>
             <a:r>
-              <a:rPr lang="en-US" smtClean="0"/>
+              <a:rPr lang="en-US"/>
               <a:t>Click to edit Master title style</a:t>
             </a:r>
-            <a:endParaRPr lang="en-US"/>
           </a:p>
         </p:txBody>
       </p:sp>
@@ -1491,8 +1478,8 @@
         </p:nvSpPr>
         <p:spPr>
           <a:xfrm>
-            <a:off x="457200" y="1535113"/>
-            <a:ext cx="4040188" cy="639762"/>
+            <a:off x="457200" y="1151335"/>
+            <a:ext cx="4040188" cy="479822"/>
           </a:xfrm>
         </p:spPr>
         <p:txBody>
@@ -1500,45 +1487,45 @@
           <a:lstStyle>
             <a:lvl1pPr marL="0" indent="0">
               <a:buNone/>
-              <a:defRPr sz="2400" b="1"/>
+              <a:defRPr sz="1800" b="1"/>
             </a:lvl1pPr>
-            <a:lvl2pPr marL="457200" indent="0">
-              <a:buNone/>
-              <a:defRPr sz="2000" b="1"/>
+            <a:lvl2pPr marL="342900" indent="0">
+              <a:buNone/>
+              <a:defRPr sz="1500" b="1"/>
             </a:lvl2pPr>
-            <a:lvl3pPr marL="914400" indent="0">
-              <a:buNone/>
-              <a:defRPr sz="1800" b="1"/>
+            <a:lvl3pPr marL="685800" indent="0">
+              <a:buNone/>
+              <a:defRPr sz="1350" b="1"/>
             </a:lvl3pPr>
-            <a:lvl4pPr marL="1371600" indent="0">
-              <a:buNone/>
-              <a:defRPr sz="1600" b="1"/>
+            <a:lvl4pPr marL="1028700" indent="0">
+              <a:buNone/>
+              <a:defRPr sz="1200" b="1"/>
             </a:lvl4pPr>
-            <a:lvl5pPr marL="1828800" indent="0">
-              <a:buNone/>
-              <a:defRPr sz="1600" b="1"/>
+            <a:lvl5pPr marL="1371600" indent="0">
+              <a:buNone/>
+              <a:defRPr sz="1200" b="1"/>
             </a:lvl5pPr>
-            <a:lvl6pPr marL="2286000" indent="0">
-              <a:buNone/>
-              <a:defRPr sz="1600" b="1"/>
+            <a:lvl6pPr marL="1714500" indent="0">
+              <a:buNone/>
+              <a:defRPr sz="1200" b="1"/>
             </a:lvl6pPr>
-            <a:lvl7pPr marL="2743200" indent="0">
-              <a:buNone/>
-              <a:defRPr sz="1600" b="1"/>
+            <a:lvl7pPr marL="2057400" indent="0">
+              <a:buNone/>
+              <a:defRPr sz="1200" b="1"/>
             </a:lvl7pPr>
-            <a:lvl8pPr marL="3200400" indent="0">
-              <a:buNone/>
-              <a:defRPr sz="1600" b="1"/>
+            <a:lvl8pPr marL="2400300" indent="0">
+              <a:buNone/>
+              <a:defRPr sz="1200" b="1"/>
             </a:lvl8pPr>
-            <a:lvl9pPr marL="3657600" indent="0">
-              <a:buNone/>
-              <a:defRPr sz="1600" b="1"/>
+            <a:lvl9pPr marL="2743200" indent="0">
+              <a:buNone/>
+              <a:defRPr sz="1200" b="1"/>
             </a:lvl9pPr>
           </a:lstStyle>
           <a:p>
             <a:pPr lvl="0"/>
             <a:r>
-              <a:rPr lang="en-US" smtClean="0"/>
+              <a:rPr lang="en-US"/>
               <a:t>Click to edit Master text styles</a:t>
             </a:r>
           </a:p>
@@ -1556,76 +1543,75 @@
         </p:nvSpPr>
         <p:spPr>
           <a:xfrm>
-            <a:off x="457200" y="2174875"/>
-            <a:ext cx="4040188" cy="3951288"/>
+            <a:off x="457200" y="1631156"/>
+            <a:ext cx="4040188" cy="2963466"/>
           </a:xfrm>
         </p:spPr>
         <p:txBody>
           <a:bodyPr/>
           <a:lstStyle>
             <a:lvl1pPr>
-              <a:defRPr sz="2400"/>
+              <a:defRPr sz="1800"/>
             </a:lvl1pPr>
             <a:lvl2pPr>
-              <a:defRPr sz="2000"/>
+              <a:defRPr sz="1500"/>
             </a:lvl2pPr>
             <a:lvl3pPr>
-              <a:defRPr sz="1800"/>
+              <a:defRPr sz="1350"/>
             </a:lvl3pPr>
             <a:lvl4pPr>
-              <a:defRPr sz="1600"/>
+              <a:defRPr sz="1200"/>
             </a:lvl4pPr>
             <a:lvl5pPr>
-              <a:defRPr sz="1600"/>
+              <a:defRPr sz="1200"/>
             </a:lvl5pPr>
             <a:lvl6pPr>
-              <a:defRPr sz="1600"/>
+              <a:defRPr sz="1200"/>
             </a:lvl6pPr>
             <a:lvl7pPr>
-              <a:defRPr sz="1600"/>
+              <a:defRPr sz="1200"/>
             </a:lvl7pPr>
             <a:lvl8pPr>
-              <a:defRPr sz="1600"/>
+              <a:defRPr sz="1200"/>
             </a:lvl8pPr>
             <a:lvl9pPr>
-              <a:defRPr sz="1600"/>
+              <a:defRPr sz="1200"/>
             </a:lvl9pPr>
           </a:lstStyle>
           <a:p>
             <a:pPr lvl="0"/>
             <a:r>
-              <a:rPr lang="en-US" smtClean="0"/>
+              <a:rPr lang="en-US"/>
               <a:t>Click to edit Master text styles</a:t>
             </a:r>
           </a:p>
           <a:p>
             <a:pPr lvl="1"/>
             <a:r>
-              <a:rPr lang="en-US" smtClean="0"/>
+              <a:rPr lang="en-US"/>
               <a:t>Second level</a:t>
             </a:r>
           </a:p>
           <a:p>
             <a:pPr lvl="2"/>
             <a:r>
-              <a:rPr lang="en-US" smtClean="0"/>
+              <a:rPr lang="en-US"/>
               <a:t>Third level</a:t>
             </a:r>
           </a:p>
           <a:p>
             <a:pPr lvl="3"/>
             <a:r>
-              <a:rPr lang="en-US" smtClean="0"/>
+              <a:rPr lang="en-US"/>
               <a:t>Fourth level</a:t>
             </a:r>
           </a:p>
           <a:p>
             <a:pPr lvl="4"/>
             <a:r>
-              <a:rPr lang="en-US" smtClean="0"/>
+              <a:rPr lang="en-US"/>
               <a:t>Fifth level</a:t>
             </a:r>
-            <a:endParaRPr lang="en-US"/>
           </a:p>
         </p:txBody>
       </p:sp>
@@ -1641,8 +1627,8 @@
         </p:nvSpPr>
         <p:spPr>
           <a:xfrm>
-            <a:off x="4645025" y="1535113"/>
-            <a:ext cx="4041775" cy="639762"/>
+            <a:off x="4645026" y="1151335"/>
+            <a:ext cx="4041775" cy="479822"/>
           </a:xfrm>
         </p:spPr>
         <p:txBody>
@@ -1650,45 +1636,45 @@
           <a:lstStyle>
             <a:lvl1pPr marL="0" indent="0">
               <a:buNone/>
-              <a:defRPr sz="2400" b="1"/>
+              <a:defRPr sz="1800" b="1"/>
             </a:lvl1pPr>
-            <a:lvl2pPr marL="457200" indent="0">
-              <a:buNone/>
-              <a:defRPr sz="2000" b="1"/>
+            <a:lvl2pPr marL="342900" indent="0">
+              <a:buNone/>
+              <a:defRPr sz="1500" b="1"/>
             </a:lvl2pPr>
-            <a:lvl3pPr marL="914400" indent="0">
-              <a:buNone/>
-              <a:defRPr sz="1800" b="1"/>
+            <a:lvl3pPr marL="685800" indent="0">
+              <a:buNone/>
+              <a:defRPr sz="1350" b="1"/>
             </a:lvl3pPr>
-            <a:lvl4pPr marL="1371600" indent="0">
-              <a:buNone/>
-              <a:defRPr sz="1600" b="1"/>
+            <a:lvl4pPr marL="1028700" indent="0">
+              <a:buNone/>
+              <a:defRPr sz="1200" b="1"/>
             </a:lvl4pPr>
-            <a:lvl5pPr marL="1828800" indent="0">
-              <a:buNone/>
-              <a:defRPr sz="1600" b="1"/>
+            <a:lvl5pPr marL="1371600" indent="0">
+              <a:buNone/>
+              <a:defRPr sz="1200" b="1"/>
             </a:lvl5pPr>
-            <a:lvl6pPr marL="2286000" indent="0">
-              <a:buNone/>
-              <a:defRPr sz="1600" b="1"/>
+            <a:lvl6pPr marL="1714500" indent="0">
+              <a:buNone/>
+              <a:defRPr sz="1200" b="1"/>
             </a:lvl6pPr>
-            <a:lvl7pPr marL="2743200" indent="0">
-              <a:buNone/>
-              <a:defRPr sz="1600" b="1"/>
+            <a:lvl7pPr marL="2057400" indent="0">
+              <a:buNone/>
+              <a:defRPr sz="1200" b="1"/>
             </a:lvl7pPr>
-            <a:lvl8pPr marL="3200400" indent="0">
-              <a:buNone/>
-              <a:defRPr sz="1600" b="1"/>
+            <a:lvl8pPr marL="2400300" indent="0">
+              <a:buNone/>
+              <a:defRPr sz="1200" b="1"/>
             </a:lvl8pPr>
-            <a:lvl9pPr marL="3657600" indent="0">
-              <a:buNone/>
-              <a:defRPr sz="1600" b="1"/>
+            <a:lvl9pPr marL="2743200" indent="0">
+              <a:buNone/>
+              <a:defRPr sz="1200" b="1"/>
             </a:lvl9pPr>
           </a:lstStyle>
           <a:p>
             <a:pPr lvl="0"/>
             <a:r>
-              <a:rPr lang="en-US" smtClean="0"/>
+              <a:rPr lang="en-US"/>
               <a:t>Click to edit Master text styles</a:t>
             </a:r>
           </a:p>
@@ -1706,76 +1692,75 @@
         </p:nvSpPr>
         <p:spPr>
           <a:xfrm>
-            <a:off x="4645025" y="2174875"/>
-            <a:ext cx="4041775" cy="3951288"/>
+            <a:off x="4645026" y="1631156"/>
+            <a:ext cx="4041775" cy="2963466"/>
           </a:xfrm>
         </p:spPr>
         <p:txBody>
           <a:bodyPr/>
           <a:lstStyle>
             <a:lvl1pPr>
-              <a:defRPr sz="2400"/>
+              <a:defRPr sz="1800"/>
             </a:lvl1pPr>
             <a:lvl2pPr>
-              <a:defRPr sz="2000"/>
+              <a:defRPr sz="1500"/>
             </a:lvl2pPr>
             <a:lvl3pPr>
-              <a:defRPr sz="1800"/>
+              <a:defRPr sz="1350"/>
             </a:lvl3pPr>
             <a:lvl4pPr>
-              <a:defRPr sz="1600"/>
+              <a:defRPr sz="1200"/>
             </a:lvl4pPr>
             <a:lvl5pPr>
-              <a:defRPr sz="1600"/>
+              <a:defRPr sz="1200"/>
             </a:lvl5pPr>
             <a:lvl6pPr>
-              <a:defRPr sz="1600"/>
+              <a:defRPr sz="1200"/>
             </a:lvl6pPr>
             <a:lvl7pPr>
-              <a:defRPr sz="1600"/>
+              <a:defRPr sz="1200"/>
             </a:lvl7pPr>
             <a:lvl8pPr>
-              <a:defRPr sz="1600"/>
+              <a:defRPr sz="1200"/>
             </a:lvl8pPr>
             <a:lvl9pPr>
-              <a:defRPr sz="1600"/>
+              <a:defRPr sz="1200"/>
             </a:lvl9pPr>
           </a:lstStyle>
           <a:p>
             <a:pPr lvl="0"/>
             <a:r>
-              <a:rPr lang="en-US" smtClean="0"/>
+              <a:rPr lang="en-US"/>
               <a:t>Click to edit Master text styles</a:t>
             </a:r>
           </a:p>
           <a:p>
             <a:pPr lvl="1"/>
             <a:r>
-              <a:rPr lang="en-US" smtClean="0"/>
+              <a:rPr lang="en-US"/>
               <a:t>Second level</a:t>
             </a:r>
           </a:p>
           <a:p>
             <a:pPr lvl="2"/>
             <a:r>
-              <a:rPr lang="en-US" smtClean="0"/>
+              <a:rPr lang="en-US"/>
               <a:t>Third level</a:t>
             </a:r>
           </a:p>
           <a:p>
             <a:pPr lvl="3"/>
             <a:r>
-              <a:rPr lang="en-US" smtClean="0"/>
+              <a:rPr lang="en-US"/>
               <a:t>Fourth level</a:t>
             </a:r>
           </a:p>
           <a:p>
             <a:pPr lvl="4"/>
             <a:r>
-              <a:rPr lang="en-US" smtClean="0"/>
+              <a:rPr lang="en-US"/>
               <a:t>Fifth level</a:t>
             </a:r>
-            <a:endParaRPr lang="en-US"/>
           </a:p>
         </p:txBody>
       </p:sp>
@@ -1796,7 +1781,7 @@
           <a:p>
             <a:fld id="{241EB5C9-1307-BA42-ABA2-0BC069CD8E7F}" type="datetimeFigureOut">
               <a:rPr lang="en-US" smtClean="0"/>
-              <a:t>4/5/2019</a:t>
+              <a:t>1/2/22</a:t>
             </a:fld>
             <a:endParaRPr lang="en-US"/>
           </a:p>
@@ -1890,10 +1875,9 @@
           <a:lstStyle/>
           <a:p>
             <a:r>
-              <a:rPr lang="en-US" smtClean="0"/>
+              <a:rPr lang="en-US"/>
               <a:t>Click to edit Master title style</a:t>
             </a:r>
-            <a:endParaRPr lang="en-US"/>
           </a:p>
         </p:txBody>
       </p:sp>
@@ -1914,7 +1898,7 @@
           <a:p>
             <a:fld id="{241EB5C9-1307-BA42-ABA2-0BC069CD8E7F}" type="datetimeFigureOut">
               <a:rPr lang="en-US" smtClean="0"/>
-              <a:t>4/5/2019</a:t>
+              <a:t>1/2/22</a:t>
             </a:fld>
             <a:endParaRPr lang="en-US"/>
           </a:p>
@@ -2009,7 +1993,7 @@
           <a:p>
             <a:fld id="{241EB5C9-1307-BA42-ABA2-0BC069CD8E7F}" type="datetimeFigureOut">
               <a:rPr lang="en-US" smtClean="0"/>
-              <a:t>4/5/2019</a:t>
+              <a:t>1/2/22</a:t>
             </a:fld>
             <a:endParaRPr lang="en-US"/>
           </a:p>
@@ -2099,23 +2083,22 @@
         </p:nvSpPr>
         <p:spPr>
           <a:xfrm>
-            <a:off x="457200" y="273050"/>
-            <a:ext cx="3008313" cy="1162050"/>
+            <a:off x="457201" y="204787"/>
+            <a:ext cx="3008313" cy="871538"/>
           </a:xfrm>
         </p:spPr>
         <p:txBody>
           <a:bodyPr anchor="b"/>
           <a:lstStyle>
             <a:lvl1pPr algn="l">
-              <a:defRPr sz="2000" b="1"/>
+              <a:defRPr sz="1500" b="1"/>
             </a:lvl1pPr>
           </a:lstStyle>
           <a:p>
             <a:r>
-              <a:rPr lang="en-US" smtClean="0"/>
+              <a:rPr lang="en-US"/>
               <a:t>Click to edit Master title style</a:t>
             </a:r>
-            <a:endParaRPr lang="en-US"/>
           </a:p>
         </p:txBody>
       </p:sp>
@@ -2131,76 +2114,75 @@
         </p:nvSpPr>
         <p:spPr>
           <a:xfrm>
-            <a:off x="3575050" y="273050"/>
-            <a:ext cx="5111750" cy="5853113"/>
+            <a:off x="3575050" y="204788"/>
+            <a:ext cx="5111750" cy="4389835"/>
           </a:xfrm>
         </p:spPr>
         <p:txBody>
           <a:bodyPr/>
           <a:lstStyle>
             <a:lvl1pPr>
-              <a:defRPr sz="3200"/>
+              <a:defRPr sz="2400"/>
             </a:lvl1pPr>
             <a:lvl2pPr>
-              <a:defRPr sz="2800"/>
+              <a:defRPr sz="2100"/>
             </a:lvl2pPr>
             <a:lvl3pPr>
-              <a:defRPr sz="2400"/>
+              <a:defRPr sz="1800"/>
             </a:lvl3pPr>
             <a:lvl4pPr>
-              <a:defRPr sz="2000"/>
+              <a:defRPr sz="1500"/>
             </a:lvl4pPr>
             <a:lvl5pPr>
-              <a:defRPr sz="2000"/>
+              <a:defRPr sz="1500"/>
             </a:lvl5pPr>
             <a:lvl6pPr>
-              <a:defRPr sz="2000"/>
+              <a:defRPr sz="1500"/>
             </a:lvl6pPr>
             <a:lvl7pPr>
-              <a:defRPr sz="2000"/>
+              <a:defRPr sz="1500"/>
             </a:lvl7pPr>
             <a:lvl8pPr>
-              <a:defRPr sz="2000"/>
+              <a:defRPr sz="1500"/>
             </a:lvl8pPr>
             <a:lvl9pPr>
-              <a:defRPr sz="2000"/>
+              <a:defRPr sz="1500"/>
             </a:lvl9pPr>
           </a:lstStyle>
           <a:p>
             <a:pPr lvl="0"/>
             <a:r>
-              <a:rPr lang="en-US" smtClean="0"/>
+              <a:rPr lang="en-US"/>
               <a:t>Click to edit Master text styles</a:t>
             </a:r>
           </a:p>
           <a:p>
             <a:pPr lvl="1"/>
             <a:r>
-              <a:rPr lang="en-US" smtClean="0"/>
+              <a:rPr lang="en-US"/>
               <a:t>Second level</a:t>
             </a:r>
           </a:p>
           <a:p>
             <a:pPr lvl="2"/>
             <a:r>
-              <a:rPr lang="en-US" smtClean="0"/>
+              <a:rPr lang="en-US"/>
               <a:t>Third level</a:t>
             </a:r>
           </a:p>
           <a:p>
             <a:pPr lvl="3"/>
             <a:r>
-              <a:rPr lang="en-US" smtClean="0"/>
+              <a:rPr lang="en-US"/>
               <a:t>Fourth level</a:t>
             </a:r>
           </a:p>
           <a:p>
             <a:pPr lvl="4"/>
             <a:r>
-              <a:rPr lang="en-US" smtClean="0"/>
+              <a:rPr lang="en-US"/>
               <a:t>Fifth level</a:t>
             </a:r>
-            <a:endParaRPr lang="en-US"/>
           </a:p>
         </p:txBody>
       </p:sp>
@@ -2216,8 +2198,8 @@
         </p:nvSpPr>
         <p:spPr>
           <a:xfrm>
-            <a:off x="457200" y="1435100"/>
-            <a:ext cx="3008313" cy="4691063"/>
+            <a:off x="457201" y="1076326"/>
+            <a:ext cx="3008313" cy="3518297"/>
           </a:xfrm>
         </p:spPr>
         <p:txBody>
@@ -2225,45 +2207,45 @@
           <a:lstStyle>
             <a:lvl1pPr marL="0" indent="0">
               <a:buNone/>
-              <a:defRPr sz="1400"/>
+              <a:defRPr sz="1050"/>
             </a:lvl1pPr>
-            <a:lvl2pPr marL="457200" indent="0">
-              <a:buNone/>
-              <a:defRPr sz="1200"/>
+            <a:lvl2pPr marL="342900" indent="0">
+              <a:buNone/>
+              <a:defRPr sz="900"/>
             </a:lvl2pPr>
-            <a:lvl3pPr marL="914400" indent="0">
-              <a:buNone/>
-              <a:defRPr sz="1000"/>
+            <a:lvl3pPr marL="685800" indent="0">
+              <a:buNone/>
+              <a:defRPr sz="750"/>
             </a:lvl3pPr>
-            <a:lvl4pPr marL="1371600" indent="0">
-              <a:buNone/>
-              <a:defRPr sz="900"/>
+            <a:lvl4pPr marL="1028700" indent="0">
+              <a:buNone/>
+              <a:defRPr sz="675"/>
             </a:lvl4pPr>
-            <a:lvl5pPr marL="1828800" indent="0">
-              <a:buNone/>
-              <a:defRPr sz="900"/>
+            <a:lvl5pPr marL="1371600" indent="0">
+              <a:buNone/>
+              <a:defRPr sz="675"/>
             </a:lvl5pPr>
-            <a:lvl6pPr marL="2286000" indent="0">
-              <a:buNone/>
-              <a:defRPr sz="900"/>
+            <a:lvl6pPr marL="1714500" indent="0">
+              <a:buNone/>
+              <a:defRPr sz="675"/>
             </a:lvl6pPr>
-            <a:lvl7pPr marL="2743200" indent="0">
-              <a:buNone/>
-              <a:defRPr sz="900"/>
+            <a:lvl7pPr marL="2057400" indent="0">
+              <a:buNone/>
+              <a:defRPr sz="675"/>
             </a:lvl7pPr>
-            <a:lvl8pPr marL="3200400" indent="0">
-              <a:buNone/>
-              <a:defRPr sz="900"/>
+            <a:lvl8pPr marL="2400300" indent="0">
+              <a:buNone/>
+              <a:defRPr sz="675"/>
             </a:lvl8pPr>
-            <a:lvl9pPr marL="3657600" indent="0">
-              <a:buNone/>
-              <a:defRPr sz="900"/>
+            <a:lvl9pPr marL="2743200" indent="0">
+              <a:buNone/>
+              <a:defRPr sz="675"/>
             </a:lvl9pPr>
           </a:lstStyle>
           <a:p>
             <a:pPr lvl="0"/>
             <a:r>
-              <a:rPr lang="en-US" smtClean="0"/>
+              <a:rPr lang="en-US"/>
               <a:t>Click to edit Master text styles</a:t>
             </a:r>
           </a:p>
@@ -2286,7 +2268,7 @@
           <a:p>
             <a:fld id="{241EB5C9-1307-BA42-ABA2-0BC069CD8E7F}" type="datetimeFigureOut">
               <a:rPr lang="en-US" smtClean="0"/>
-              <a:t>4/5/2019</a:t>
+              <a:t>1/2/22</a:t>
             </a:fld>
             <a:endParaRPr lang="en-US"/>
           </a:p>
@@ -2376,23 +2358,22 @@
         </p:nvSpPr>
         <p:spPr>
           <a:xfrm>
-            <a:off x="1792288" y="4800600"/>
-            <a:ext cx="5486400" cy="566738"/>
+            <a:off x="1792288" y="3600450"/>
+            <a:ext cx="5486400" cy="425054"/>
           </a:xfrm>
         </p:spPr>
         <p:txBody>
           <a:bodyPr anchor="b"/>
           <a:lstStyle>
             <a:lvl1pPr algn="l">
-              <a:defRPr sz="2000" b="1"/>
+              <a:defRPr sz="1500" b="1"/>
             </a:lvl1pPr>
           </a:lstStyle>
           <a:p>
             <a:r>
-              <a:rPr lang="en-US" smtClean="0"/>
+              <a:rPr lang="en-US"/>
               <a:t>Click to edit Master title style</a:t>
             </a:r>
-            <a:endParaRPr lang="en-US"/>
           </a:p>
         </p:txBody>
       </p:sp>
@@ -2408,8 +2389,8 @@
         </p:nvSpPr>
         <p:spPr>
           <a:xfrm>
-            <a:off x="1792288" y="612775"/>
-            <a:ext cx="5486400" cy="4114800"/>
+            <a:off x="1792288" y="459581"/>
+            <a:ext cx="5486400" cy="3086100"/>
           </a:xfrm>
         </p:spPr>
         <p:txBody>
@@ -2417,39 +2398,39 @@
           <a:lstStyle>
             <a:lvl1pPr marL="0" indent="0">
               <a:buNone/>
-              <a:defRPr sz="3200"/>
+              <a:defRPr sz="2400"/>
             </a:lvl1pPr>
-            <a:lvl2pPr marL="457200" indent="0">
-              <a:buNone/>
-              <a:defRPr sz="2800"/>
+            <a:lvl2pPr marL="342900" indent="0">
+              <a:buNone/>
+              <a:defRPr sz="2100"/>
             </a:lvl2pPr>
-            <a:lvl3pPr marL="914400" indent="0">
-              <a:buNone/>
-              <a:defRPr sz="2400"/>
+            <a:lvl3pPr marL="685800" indent="0">
+              <a:buNone/>
+              <a:defRPr sz="1800"/>
             </a:lvl3pPr>
-            <a:lvl4pPr marL="1371600" indent="0">
-              <a:buNone/>
-              <a:defRPr sz="2000"/>
+            <a:lvl4pPr marL="1028700" indent="0">
+              <a:buNone/>
+              <a:defRPr sz="1500"/>
             </a:lvl4pPr>
-            <a:lvl5pPr marL="1828800" indent="0">
-              <a:buNone/>
-              <a:defRPr sz="2000"/>
+            <a:lvl5pPr marL="1371600" indent="0">
+              <a:buNone/>
+              <a:defRPr sz="1500"/>
             </a:lvl5pPr>
-            <a:lvl6pPr marL="2286000" indent="0">
-              <a:buNone/>
-              <a:defRPr sz="2000"/>
+            <a:lvl6pPr marL="1714500" indent="0">
+              <a:buNone/>
+              <a:defRPr sz="1500"/>
             </a:lvl6pPr>
-            <a:lvl7pPr marL="2743200" indent="0">
-              <a:buNone/>
-              <a:defRPr sz="2000"/>
+            <a:lvl7pPr marL="2057400" indent="0">
+              <a:buNone/>
+              <a:defRPr sz="1500"/>
             </a:lvl7pPr>
-            <a:lvl8pPr marL="3200400" indent="0">
-              <a:buNone/>
-              <a:defRPr sz="2000"/>
+            <a:lvl8pPr marL="2400300" indent="0">
+              <a:buNone/>
+              <a:defRPr sz="1500"/>
             </a:lvl8pPr>
-            <a:lvl9pPr marL="3657600" indent="0">
-              <a:buNone/>
-              <a:defRPr sz="2000"/>
+            <a:lvl9pPr marL="2743200" indent="0">
+              <a:buNone/>
+              <a:defRPr sz="1500"/>
             </a:lvl9pPr>
           </a:lstStyle>
           <a:p>
@@ -2469,8 +2450,8 @@
         </p:nvSpPr>
         <p:spPr>
           <a:xfrm>
-            <a:off x="1792288" y="5367338"/>
-            <a:ext cx="5486400" cy="804862"/>
+            <a:off x="1792288" y="4025503"/>
+            <a:ext cx="5486400" cy="603647"/>
           </a:xfrm>
         </p:spPr>
         <p:txBody>
@@ -2478,45 +2459,45 @@
           <a:lstStyle>
             <a:lvl1pPr marL="0" indent="0">
               <a:buNone/>
-              <a:defRPr sz="1400"/>
+              <a:defRPr sz="1050"/>
             </a:lvl1pPr>
-            <a:lvl2pPr marL="457200" indent="0">
-              <a:buNone/>
-              <a:defRPr sz="1200"/>
+            <a:lvl2pPr marL="342900" indent="0">
+              <a:buNone/>
+              <a:defRPr sz="900"/>
             </a:lvl2pPr>
-            <a:lvl3pPr marL="914400" indent="0">
-              <a:buNone/>
-              <a:defRPr sz="1000"/>
+            <a:lvl3pPr marL="685800" indent="0">
+              <a:buNone/>
+              <a:defRPr sz="750"/>
             </a:lvl3pPr>
-            <a:lvl4pPr marL="1371600" indent="0">
-              <a:buNone/>
-              <a:defRPr sz="900"/>
+            <a:lvl4pPr marL="1028700" indent="0">
+              <a:buNone/>
+              <a:defRPr sz="675"/>
             </a:lvl4pPr>
-            <a:lvl5pPr marL="1828800" indent="0">
-              <a:buNone/>
-              <a:defRPr sz="900"/>
+            <a:lvl5pPr marL="1371600" indent="0">
+              <a:buNone/>
+              <a:defRPr sz="675"/>
             </a:lvl5pPr>
-            <a:lvl6pPr marL="2286000" indent="0">
-              <a:buNone/>
-              <a:defRPr sz="900"/>
+            <a:lvl6pPr marL="1714500" indent="0">
+              <a:buNone/>
+              <a:defRPr sz="675"/>
             </a:lvl6pPr>
-            <a:lvl7pPr marL="2743200" indent="0">
-              <a:buNone/>
-              <a:defRPr sz="900"/>
+            <a:lvl7pPr marL="2057400" indent="0">
+              <a:buNone/>
+              <a:defRPr sz="675"/>
             </a:lvl7pPr>
-            <a:lvl8pPr marL="3200400" indent="0">
-              <a:buNone/>
-              <a:defRPr sz="900"/>
+            <a:lvl8pPr marL="2400300" indent="0">
+              <a:buNone/>
+              <a:defRPr sz="675"/>
             </a:lvl8pPr>
-            <a:lvl9pPr marL="3657600" indent="0">
-              <a:buNone/>
-              <a:defRPr sz="900"/>
+            <a:lvl9pPr marL="2743200" indent="0">
+              <a:buNone/>
+              <a:defRPr sz="675"/>
             </a:lvl9pPr>
           </a:lstStyle>
           <a:p>
             <a:pPr lvl="0"/>
             <a:r>
-              <a:rPr lang="en-US" smtClean="0"/>
+              <a:rPr lang="en-US"/>
               <a:t>Click to edit Master text styles</a:t>
             </a:r>
           </a:p>
@@ -2539,7 +2520,7 @@
           <a:p>
             <a:fld id="{241EB5C9-1307-BA42-ABA2-0BC069CD8E7F}" type="datetimeFigureOut">
               <a:rPr lang="en-US" smtClean="0"/>
-              <a:t>4/5/2019</a:t>
+              <a:t>1/2/22</a:t>
             </a:fld>
             <a:endParaRPr lang="en-US"/>
           </a:p>
@@ -2634,8 +2615,8 @@
         </p:nvSpPr>
         <p:spPr>
           <a:xfrm>
-            <a:off x="457200" y="274638"/>
-            <a:ext cx="8229600" cy="1143000"/>
+            <a:off x="457200" y="205979"/>
+            <a:ext cx="8229600" cy="857250"/>
           </a:xfrm>
           <a:prstGeom prst="rect">
             <a:avLst/>
@@ -2648,10 +2629,9 @@
           <a:lstStyle/>
           <a:p>
             <a:r>
-              <a:rPr lang="en-US" smtClean="0"/>
+              <a:rPr lang="en-US"/>
               <a:t>Click to edit Master title style</a:t>
             </a:r>
-            <a:endParaRPr lang="en-US"/>
           </a:p>
         </p:txBody>
       </p:sp>
@@ -2667,8 +2647,8 @@
         </p:nvSpPr>
         <p:spPr>
           <a:xfrm>
-            <a:off x="457200" y="1600200"/>
-            <a:ext cx="8229600" cy="4525963"/>
+            <a:off x="457200" y="1200151"/>
+            <a:ext cx="8229600" cy="3394472"/>
           </a:xfrm>
           <a:prstGeom prst="rect">
             <a:avLst/>
@@ -2682,38 +2662,37 @@
           <a:p>
             <a:pPr lvl="0"/>
             <a:r>
-              <a:rPr lang="en-US" smtClean="0"/>
+              <a:rPr lang="en-US"/>
               <a:t>Click to edit Master text styles</a:t>
             </a:r>
           </a:p>
           <a:p>
             <a:pPr lvl="1"/>
             <a:r>
-              <a:rPr lang="en-US" smtClean="0"/>
+              <a:rPr lang="en-US"/>
               <a:t>Second level</a:t>
             </a:r>
           </a:p>
           <a:p>
             <a:pPr lvl="2"/>
             <a:r>
-              <a:rPr lang="en-US" smtClean="0"/>
+              <a:rPr lang="en-US"/>
               <a:t>Third level</a:t>
             </a:r>
           </a:p>
           <a:p>
             <a:pPr lvl="3"/>
             <a:r>
-              <a:rPr lang="en-US" smtClean="0"/>
+              <a:rPr lang="en-US"/>
               <a:t>Fourth level</a:t>
             </a:r>
           </a:p>
           <a:p>
             <a:pPr lvl="4"/>
             <a:r>
-              <a:rPr lang="en-US" smtClean="0"/>
+              <a:rPr lang="en-US"/>
               <a:t>Fifth level</a:t>
             </a:r>
-            <a:endParaRPr lang="en-US"/>
           </a:p>
         </p:txBody>
       </p:sp>
@@ -2729,8 +2708,8 @@
         </p:nvSpPr>
         <p:spPr>
           <a:xfrm>
-            <a:off x="457200" y="6356350"/>
-            <a:ext cx="2133600" cy="365125"/>
+            <a:off x="457200" y="4767263"/>
+            <a:ext cx="2133600" cy="273844"/>
           </a:xfrm>
           <a:prstGeom prst="rect">
             <a:avLst/>
@@ -2740,7 +2719,7 @@
           <a:bodyPr anchor="ctr" bIns="45720" lIns="91440" rIns="91440" rtlCol="0" tIns="45720" vert="horz"/>
           <a:lstStyle>
             <a:lvl1pPr algn="l">
-              <a:defRPr sz="1200">
+              <a:defRPr sz="900">
                 <a:solidFill>
                   <a:schemeClr val="tx1">
                     <a:tint val="75000"/>
@@ -2752,7 +2731,7 @@
           <a:p>
             <a:fld id="{241EB5C9-1307-BA42-ABA2-0BC069CD8E7F}" type="datetimeFigureOut">
               <a:rPr lang="en-US" smtClean="0"/>
-              <a:t>4/5/2019</a:t>
+              <a:t>1/2/22</a:t>
             </a:fld>
             <a:endParaRPr lang="en-US"/>
           </a:p>
@@ -2770,8 +2749,8 @@
         </p:nvSpPr>
         <p:spPr>
           <a:xfrm>
-            <a:off x="3124200" y="6356350"/>
-            <a:ext cx="2895600" cy="365125"/>
+            <a:off x="3124200" y="4767263"/>
+            <a:ext cx="2895600" cy="273844"/>
           </a:xfrm>
           <a:prstGeom prst="rect">
             <a:avLst/>
@@ -2781,7 +2760,7 @@
           <a:bodyPr anchor="ctr" bIns="45720" lIns="91440" rIns="91440" rtlCol="0" tIns="45720" vert="horz"/>
           <a:lstStyle>
             <a:lvl1pPr algn="ctr">
-              <a:defRPr sz="1200">
+              <a:defRPr sz="900">
                 <a:solidFill>
                   <a:schemeClr val="tx1">
                     <a:tint val="75000"/>
@@ -2807,8 +2786,8 @@
         </p:nvSpPr>
         <p:spPr>
           <a:xfrm>
-            <a:off x="6553200" y="6356350"/>
-            <a:ext cx="2133600" cy="365125"/>
+            <a:off x="6553200" y="4767263"/>
+            <a:ext cx="2133600" cy="273844"/>
           </a:xfrm>
           <a:prstGeom prst="rect">
             <a:avLst/>
@@ -2818,7 +2797,7 @@
           <a:bodyPr anchor="ctr" bIns="45720" lIns="91440" rIns="91440" rtlCol="0" tIns="45720" vert="horz"/>
           <a:lstStyle>
             <a:lvl1pPr algn="r">
-              <a:defRPr sz="1200">
+              <a:defRPr sz="900">
                 <a:solidFill>
                   <a:schemeClr val="tx1">
                     <a:tint val="75000"/>
@@ -2859,12 +2838,12 @@
   </p:sldLayoutIdLst>
   <p:txStyles>
     <p:titleStyle>
-      <a:lvl1pPr algn="ctr" defTabSz="457200" eaLnBrk="1" hangingPunct="1" latinLnBrk="0" rtl="0">
+      <a:lvl1pPr algn="ctr" defTabSz="342900" eaLnBrk="1" hangingPunct="1" latinLnBrk="0" rtl="0">
         <a:spcBef>
           <a:spcPct val="0"/>
         </a:spcBef>
         <a:buNone/>
-        <a:defRPr kern="1200" sz="4400">
+        <a:defRPr kern="1200" sz="3300">
           <a:solidFill>
             <a:schemeClr val="tx1"/>
           </a:solidFill>
@@ -2875,37 +2854,7 @@
       </a:lvl1pPr>
     </p:titleStyle>
     <p:bodyStyle>
-      <a:lvl1pPr algn="l" defTabSz="457200" eaLnBrk="1" hangingPunct="1" indent="-457200" latinLnBrk="0" marL="457200" rtl="0">
-        <a:spcBef>
-          <a:spcPct val="20000"/>
-        </a:spcBef>
-        <a:buFont typeface="Arial"/>
-        <a:buChar char="•"/>
-        <a:defRPr kern="1200" sz="3200">
-          <a:solidFill>
-            <a:schemeClr val="tx1"/>
-          </a:solidFill>
-          <a:latin typeface="+mn-lt"/>
-          <a:ea typeface="+mn-ea"/>
-          <a:cs typeface="+mn-cs"/>
-        </a:defRPr>
-      </a:lvl1pPr>
-      <a:lvl2pPr algn="l" defTabSz="457200" eaLnBrk="1" hangingPunct="1" indent="-457200" latinLnBrk="0" marL="914400" rtl="0">
-        <a:spcBef>
-          <a:spcPct val="20000"/>
-        </a:spcBef>
-        <a:buFont typeface="Arial"/>
-        <a:buChar char="–"/>
-        <a:defRPr kern="1200" sz="2800">
-          <a:solidFill>
-            <a:schemeClr val="tx1"/>
-          </a:solidFill>
-          <a:latin typeface="+mn-lt"/>
-          <a:ea typeface="+mn-ea"/>
-          <a:cs typeface="+mn-cs"/>
-        </a:defRPr>
-      </a:lvl2pPr>
-      <a:lvl3pPr algn="l" defTabSz="457200" eaLnBrk="1" hangingPunct="1" indent="-457200" latinLnBrk="0" marL="1371600" rtl="0">
+      <a:lvl1pPr algn="l" defTabSz="342900" eaLnBrk="1" hangingPunct="1" indent="-342900" latinLnBrk="0" marL="342900" rtl="0">
         <a:spcBef>
           <a:spcPct val="20000"/>
         </a:spcBef>
@@ -2919,14 +2868,44 @@
           <a:ea typeface="+mn-ea"/>
           <a:cs typeface="+mn-cs"/>
         </a:defRPr>
-      </a:lvl3pPr>
-      <a:lvl4pPr algn="l" defTabSz="457200" eaLnBrk="1" hangingPunct="1" indent="-457200" latinLnBrk="0" marL="1828800" rtl="0">
+      </a:lvl1pPr>
+      <a:lvl2pPr algn="l" defTabSz="342900" eaLnBrk="1" hangingPunct="1" indent="-342900" latinLnBrk="0" marL="685800" rtl="0">
         <a:spcBef>
           <a:spcPct val="20000"/>
         </a:spcBef>
         <a:buFont typeface="Arial"/>
         <a:buChar char="–"/>
-        <a:defRPr kern="1200" sz="2000">
+        <a:defRPr kern="1200" sz="2100">
+          <a:solidFill>
+            <a:schemeClr val="tx1"/>
+          </a:solidFill>
+          <a:latin typeface="+mn-lt"/>
+          <a:ea typeface="+mn-ea"/>
+          <a:cs typeface="+mn-cs"/>
+        </a:defRPr>
+      </a:lvl2pPr>
+      <a:lvl3pPr algn="l" defTabSz="342900" eaLnBrk="1" hangingPunct="1" indent="-342900" latinLnBrk="0" marL="1028700" rtl="0">
+        <a:spcBef>
+          <a:spcPct val="20000"/>
+        </a:spcBef>
+        <a:buFont typeface="Arial"/>
+        <a:buChar char="•"/>
+        <a:defRPr kern="1200" sz="1800">
+          <a:solidFill>
+            <a:schemeClr val="tx1"/>
+          </a:solidFill>
+          <a:latin typeface="+mn-lt"/>
+          <a:ea typeface="+mn-ea"/>
+          <a:cs typeface="+mn-cs"/>
+        </a:defRPr>
+      </a:lvl3pPr>
+      <a:lvl4pPr algn="l" defTabSz="342900" eaLnBrk="1" hangingPunct="1" indent="-342900" latinLnBrk="0" marL="1371600" rtl="0">
+        <a:spcBef>
+          <a:spcPct val="20000"/>
+        </a:spcBef>
+        <a:buFont typeface="Arial"/>
+        <a:buChar char="–"/>
+        <a:defRPr kern="1200" sz="1500">
           <a:solidFill>
             <a:schemeClr val="tx1"/>
           </a:solidFill>
@@ -2935,13 +2914,13 @@
           <a:cs typeface="+mn-cs"/>
         </a:defRPr>
       </a:lvl4pPr>
-      <a:lvl5pPr algn="l" defTabSz="457200" eaLnBrk="1" hangingPunct="1" indent="-457200" latinLnBrk="0" marL="2286000" rtl="0">
+      <a:lvl5pPr algn="l" defTabSz="342900" eaLnBrk="1" hangingPunct="1" indent="-342900" latinLnBrk="0" marL="1714500" rtl="0">
         <a:spcBef>
           <a:spcPct val="20000"/>
         </a:spcBef>
         <a:buFont typeface="Arial"/>
         <a:buChar char="»"/>
-        <a:defRPr kern="1200" sz="2000">
+        <a:defRPr kern="1200" sz="1500">
           <a:solidFill>
             <a:schemeClr val="tx1"/>
           </a:solidFill>
@@ -2950,13 +2929,13 @@
           <a:cs typeface="+mn-cs"/>
         </a:defRPr>
       </a:lvl5pPr>
-      <a:lvl6pPr algn="l" defTabSz="457200" eaLnBrk="1" hangingPunct="1" indent="-457200" latinLnBrk="0" marL="2743200" rtl="0">
+      <a:lvl6pPr algn="l" defTabSz="342900" eaLnBrk="1" hangingPunct="1" indent="-342900" latinLnBrk="0" marL="2057400" rtl="0">
         <a:spcBef>
           <a:spcPct val="20000"/>
         </a:spcBef>
         <a:buFont typeface="Arial"/>
         <a:buChar char="•"/>
-        <a:defRPr kern="1200" sz="2000">
+        <a:defRPr kern="1200" sz="1500">
           <a:solidFill>
             <a:schemeClr val="tx1"/>
           </a:solidFill>
@@ -2965,13 +2944,13 @@
           <a:cs typeface="+mn-cs"/>
         </a:defRPr>
       </a:lvl6pPr>
-      <a:lvl7pPr algn="l" defTabSz="457200" eaLnBrk="1" hangingPunct="1" indent="-457200" latinLnBrk="0" marL="3200400" rtl="0">
+      <a:lvl7pPr algn="l" defTabSz="342900" eaLnBrk="1" hangingPunct="1" indent="-342900" latinLnBrk="0" marL="2400300" rtl="0">
         <a:spcBef>
           <a:spcPct val="20000"/>
         </a:spcBef>
         <a:buFont typeface="Arial"/>
         <a:buChar char="•"/>
-        <a:defRPr kern="1200" sz="2000">
+        <a:defRPr kern="1200" sz="1500">
           <a:solidFill>
             <a:schemeClr val="tx1"/>
           </a:solidFill>
@@ -2980,13 +2959,13 @@
           <a:cs typeface="+mn-cs"/>
         </a:defRPr>
       </a:lvl7pPr>
-      <a:lvl8pPr algn="l" defTabSz="457200" eaLnBrk="1" hangingPunct="1" indent="-457200" latinLnBrk="0" marL="3657600" rtl="0">
+      <a:lvl8pPr algn="l" defTabSz="342900" eaLnBrk="1" hangingPunct="1" indent="-342900" latinLnBrk="0" marL="2743200" rtl="0">
         <a:spcBef>
           <a:spcPct val="20000"/>
         </a:spcBef>
         <a:buFont typeface="Arial"/>
         <a:buChar char="•"/>
-        <a:defRPr kern="1200" sz="2000">
+        <a:defRPr kern="1200" sz="1500">
           <a:solidFill>
             <a:schemeClr val="tx1"/>
           </a:solidFill>
@@ -2995,13 +2974,13 @@
           <a:cs typeface="+mn-cs"/>
         </a:defRPr>
       </a:lvl8pPr>
-      <a:lvl9pPr algn="l" defTabSz="457200" eaLnBrk="1" hangingPunct="1" indent="-457200" latinLnBrk="0" marL="4114800" rtl="0">
+      <a:lvl9pPr algn="l" defTabSz="342900" eaLnBrk="1" hangingPunct="1" indent="-342900" latinLnBrk="0" marL="3086100" rtl="0">
         <a:spcBef>
           <a:spcPct val="20000"/>
         </a:spcBef>
         <a:buFont typeface="Arial"/>
         <a:buChar char="•"/>
-        <a:defRPr kern="1200" sz="2000">
+        <a:defRPr kern="1200" sz="1500">
           <a:solidFill>
             <a:schemeClr val="tx1"/>
           </a:solidFill>
@@ -3015,8 +2994,8 @@
       <a:defPPr>
         <a:defRPr lang="en-US"/>
       </a:defPPr>
-      <a:lvl1pPr algn="l" defTabSz="457200" eaLnBrk="1" hangingPunct="1" latinLnBrk="0" marL="0" rtl="0">
-        <a:defRPr kern="1200" sz="1800">
+      <a:lvl1pPr algn="l" defTabSz="342900" eaLnBrk="1" hangingPunct="1" latinLnBrk="0" marL="0" rtl="0">
+        <a:defRPr kern="1200" sz="1350">
           <a:solidFill>
             <a:schemeClr val="tx1"/>
           </a:solidFill>
@@ -3025,8 +3004,8 @@
           <a:cs typeface="+mn-cs"/>
         </a:defRPr>
       </a:lvl1pPr>
-      <a:lvl2pPr algn="l" defTabSz="457200" eaLnBrk="1" hangingPunct="1" latinLnBrk="0" marL="457200" rtl="0">
-        <a:defRPr kern="1200" sz="1800">
+      <a:lvl2pPr algn="l" defTabSz="342900" eaLnBrk="1" hangingPunct="1" latinLnBrk="0" marL="342900" rtl="0">
+        <a:defRPr kern="1200" sz="1350">
           <a:solidFill>
             <a:schemeClr val="tx1"/>
           </a:solidFill>
@@ -3035,8 +3014,8 @@
           <a:cs typeface="+mn-cs"/>
         </a:defRPr>
       </a:lvl2pPr>
-      <a:lvl3pPr algn="l" defTabSz="457200" eaLnBrk="1" hangingPunct="1" latinLnBrk="0" marL="914400" rtl="0">
-        <a:defRPr kern="1200" sz="1800">
+      <a:lvl3pPr algn="l" defTabSz="342900" eaLnBrk="1" hangingPunct="1" latinLnBrk="0" marL="685800" rtl="0">
+        <a:defRPr kern="1200" sz="1350">
           <a:solidFill>
             <a:schemeClr val="tx1"/>
           </a:solidFill>
@@ -3045,8 +3024,8 @@
           <a:cs typeface="+mn-cs"/>
         </a:defRPr>
       </a:lvl3pPr>
-      <a:lvl4pPr algn="l" defTabSz="457200" eaLnBrk="1" hangingPunct="1" latinLnBrk="0" marL="1371600" rtl="0">
-        <a:defRPr kern="1200" sz="1800">
+      <a:lvl4pPr algn="l" defTabSz="342900" eaLnBrk="1" hangingPunct="1" latinLnBrk="0" marL="1028700" rtl="0">
+        <a:defRPr kern="1200" sz="1350">
           <a:solidFill>
             <a:schemeClr val="tx1"/>
           </a:solidFill>
@@ -3055,8 +3034,8 @@
           <a:cs typeface="+mn-cs"/>
         </a:defRPr>
       </a:lvl4pPr>
-      <a:lvl5pPr algn="l" defTabSz="457200" eaLnBrk="1" hangingPunct="1" latinLnBrk="0" marL="1828800" rtl="0">
-        <a:defRPr kern="1200" sz="1800">
+      <a:lvl5pPr algn="l" defTabSz="342900" eaLnBrk="1" hangingPunct="1" latinLnBrk="0" marL="1371600" rtl="0">
+        <a:defRPr kern="1200" sz="1350">
           <a:solidFill>
             <a:schemeClr val="tx1"/>
           </a:solidFill>
@@ -3065,8 +3044,8 @@
           <a:cs typeface="+mn-cs"/>
         </a:defRPr>
       </a:lvl5pPr>
-      <a:lvl6pPr algn="l" defTabSz="457200" eaLnBrk="1" hangingPunct="1" latinLnBrk="0" marL="2286000" rtl="0">
-        <a:defRPr kern="1200" sz="1800">
+      <a:lvl6pPr algn="l" defTabSz="342900" eaLnBrk="1" hangingPunct="1" latinLnBrk="0" marL="1714500" rtl="0">
+        <a:defRPr kern="1200" sz="1350">
           <a:solidFill>
             <a:schemeClr val="tx1"/>
           </a:solidFill>
@@ -3075,8 +3054,8 @@
           <a:cs typeface="+mn-cs"/>
         </a:defRPr>
       </a:lvl6pPr>
-      <a:lvl7pPr algn="l" defTabSz="457200" eaLnBrk="1" hangingPunct="1" latinLnBrk="0" marL="2743200" rtl="0">
-        <a:defRPr kern="1200" sz="1800">
+      <a:lvl7pPr algn="l" defTabSz="342900" eaLnBrk="1" hangingPunct="1" latinLnBrk="0" marL="2057400" rtl="0">
+        <a:defRPr kern="1200" sz="1350">
           <a:solidFill>
             <a:schemeClr val="tx1"/>
           </a:solidFill>
@@ -3085,8 +3064,8 @@
           <a:cs typeface="+mn-cs"/>
         </a:defRPr>
       </a:lvl7pPr>
-      <a:lvl8pPr algn="l" defTabSz="457200" eaLnBrk="1" hangingPunct="1" latinLnBrk="0" marL="3200400" rtl="0">
-        <a:defRPr kern="1200" sz="1800">
+      <a:lvl8pPr algn="l" defTabSz="342900" eaLnBrk="1" hangingPunct="1" latinLnBrk="0" marL="2400300" rtl="0">
+        <a:defRPr kern="1200" sz="1350">
           <a:solidFill>
             <a:schemeClr val="tx1"/>
           </a:solidFill>
@@ -3095,8 +3074,8 @@
           <a:cs typeface="+mn-cs"/>
         </a:defRPr>
       </a:lvl8pPr>
-      <a:lvl9pPr algn="l" defTabSz="457200" eaLnBrk="1" hangingPunct="1" latinLnBrk="0" marL="3657600" rtl="0">
-        <a:defRPr kern="1200" sz="1800">
+      <a:lvl9pPr algn="l" defTabSz="342900" eaLnBrk="1" hangingPunct="1" latinLnBrk="0" marL="2743200" rtl="0">
+        <a:defRPr kern="1200" sz="1350">
           <a:solidFill>
             <a:schemeClr val="tx1"/>
           </a:solidFill>
@@ -3139,8 +3118,8 @@
         </p:nvSpPr>
         <p:spPr>
           <a:xfrm>
-            <a:off x="685800" y="2130425"/>
-            <a:ext cx="7772400" cy="1470025"/>
+            <a:off x="685800" y="1597819"/>
+            <a:ext cx="7772400" cy="1102519"/>
           </a:xfrm>
         </p:spPr>
         <p:txBody>
@@ -3169,8 +3148,8 @@
         </p:nvSpPr>
         <p:spPr>
           <a:xfrm>
-            <a:off x="1371600" y="3886200"/>
-            <a:ext cx="6400800" cy="1752600"/>
+            <a:off x="1371600" y="2914650"/>
+            <a:ext cx="6400800" cy="1314450"/>
           </a:xfrm>
         </p:spPr>
         <p:txBody>
@@ -3342,8 +3321,8 @@
         </p:blipFill>
         <p:spPr bwMode="auto">
           <a:xfrm>
-            <a:off x="4749800" y="266700"/>
-            <a:ext cx="2743200" cy="5334000"/>
+            <a:off x="5118100" y="203200"/>
+            <a:ext cx="1993900" cy="3873500"/>
           </a:xfrm>
           <a:prstGeom prst="rect">
             <a:avLst/>
@@ -3364,7 +3343,7 @@
         </p:nvSpPr>
         <p:spPr>
           <a:xfrm>
-            <a:off x="3568700" y="5600700"/>
+            <a:off x="3568700" y="4076700"/>
             <a:ext cx="5105400" cy="508000"/>
           </a:xfrm>
           <a:prstGeom prst="rect">
@@ -6890,8 +6869,8 @@
         </p:blipFill>
         <p:spPr bwMode="auto">
           <a:xfrm>
-            <a:off x="4749800" y="266700"/>
-            <a:ext cx="2743200" cy="5334000"/>
+            <a:off x="5118100" y="203200"/>
+            <a:ext cx="1993900" cy="3873500"/>
           </a:xfrm>
           <a:prstGeom prst="rect">
             <a:avLst/>
@@ -6912,7 +6891,7 @@
         </p:nvSpPr>
         <p:spPr>
           <a:xfrm>
-            <a:off x="3568700" y="5600700"/>
+            <a:off x="3568700" y="4076700"/>
             <a:ext cx="5105400" cy="508000"/>
           </a:xfrm>
           <a:prstGeom prst="rect">
@@ -7011,8 +6990,8 @@
         </p:blipFill>
         <p:spPr bwMode="auto">
           <a:xfrm>
-            <a:off x="4749800" y="266700"/>
-            <a:ext cx="2743200" cy="5334000"/>
+            <a:off x="5118100" y="203200"/>
+            <a:ext cx="1993900" cy="3873500"/>
           </a:xfrm>
           <a:prstGeom prst="rect">
             <a:avLst/>
@@ -7033,7 +7012,7 @@
         </p:nvSpPr>
         <p:spPr>
           <a:xfrm>
-            <a:off x="3568700" y="5600700"/>
+            <a:off x="3568700" y="4076700"/>
             <a:ext cx="5105400" cy="508000"/>
           </a:xfrm>
           <a:prstGeom prst="rect">
@@ -7132,8 +7111,8 @@
         </p:blipFill>
         <p:spPr bwMode="auto">
           <a:xfrm>
-            <a:off x="4749800" y="266700"/>
-            <a:ext cx="2743200" cy="5334000"/>
+            <a:off x="5118100" y="203200"/>
+            <a:ext cx="1993900" cy="3873500"/>
           </a:xfrm>
           <a:prstGeom prst="rect">
             <a:avLst/>
@@ -7154,7 +7133,7 @@
         </p:nvSpPr>
         <p:spPr>
           <a:xfrm>
-            <a:off x="3568700" y="5600700"/>
+            <a:off x="3568700" y="4076700"/>
             <a:ext cx="5105400" cy="508000"/>
           </a:xfrm>
           <a:prstGeom prst="rect">
@@ -7253,8 +7232,8 @@
         </p:blipFill>
         <p:spPr bwMode="auto">
           <a:xfrm>
-            <a:off x="4749800" y="266700"/>
-            <a:ext cx="2743200" cy="5334000"/>
+            <a:off x="5118100" y="203200"/>
+            <a:ext cx="1993900" cy="3873500"/>
           </a:xfrm>
           <a:prstGeom prst="rect">
             <a:avLst/>
@@ -7275,7 +7254,7 @@
         </p:nvSpPr>
         <p:spPr>
           <a:xfrm>
-            <a:off x="3568700" y="5600700"/>
+            <a:off x="3568700" y="4076700"/>
             <a:ext cx="5105400" cy="508000"/>
           </a:xfrm>
           <a:prstGeom prst="rect">
@@ -7374,8 +7353,8 @@
         </p:blipFill>
         <p:spPr bwMode="auto">
           <a:xfrm>
-            <a:off x="4749800" y="266700"/>
-            <a:ext cx="2743200" cy="5334000"/>
+            <a:off x="5118100" y="203200"/>
+            <a:ext cx="1993900" cy="3873500"/>
           </a:xfrm>
           <a:prstGeom prst="rect">
             <a:avLst/>
@@ -7396,7 +7375,7 @@
         </p:nvSpPr>
         <p:spPr>
           <a:xfrm>
-            <a:off x="3568700" y="5600700"/>
+            <a:off x="3568700" y="4076700"/>
             <a:ext cx="5105400" cy="508000"/>
           </a:xfrm>
           <a:prstGeom prst="rect">

</xml_diff>